<commit_message>
delete trivial files and update other files
</commit_message>
<xml_diff>
--- a/outline.pptx
+++ b/outline.pptx
@@ -265,7 +265,7 @@
           <a:p>
             <a:fld id="{95B7E5AE-4E20-4443-8EB7-6826520C18AF}" type="datetimeFigureOut">
               <a:rPr kumimoji="1" lang="zh-TW" altLang="en-US" smtClean="0"/>
-              <a:t>2023/4/24</a:t>
+              <a:t>2023/4/27</a:t>
             </a:fld>
             <a:endParaRPr kumimoji="1" lang="zh-TW" altLang="en-US"/>
           </a:p>
@@ -463,7 +463,7 @@
           <a:p>
             <a:fld id="{95B7E5AE-4E20-4443-8EB7-6826520C18AF}" type="datetimeFigureOut">
               <a:rPr kumimoji="1" lang="zh-TW" altLang="en-US" smtClean="0"/>
-              <a:t>2023/4/24</a:t>
+              <a:t>2023/4/27</a:t>
             </a:fld>
             <a:endParaRPr kumimoji="1" lang="zh-TW" altLang="en-US"/>
           </a:p>
@@ -671,7 +671,7 @@
           <a:p>
             <a:fld id="{95B7E5AE-4E20-4443-8EB7-6826520C18AF}" type="datetimeFigureOut">
               <a:rPr kumimoji="1" lang="zh-TW" altLang="en-US" smtClean="0"/>
-              <a:t>2023/4/24</a:t>
+              <a:t>2023/4/27</a:t>
             </a:fld>
             <a:endParaRPr kumimoji="1" lang="zh-TW" altLang="en-US"/>
           </a:p>
@@ -869,7 +869,7 @@
           <a:p>
             <a:fld id="{95B7E5AE-4E20-4443-8EB7-6826520C18AF}" type="datetimeFigureOut">
               <a:rPr kumimoji="1" lang="zh-TW" altLang="en-US" smtClean="0"/>
-              <a:t>2023/4/24</a:t>
+              <a:t>2023/4/27</a:t>
             </a:fld>
             <a:endParaRPr kumimoji="1" lang="zh-TW" altLang="en-US"/>
           </a:p>
@@ -1144,7 +1144,7 @@
           <a:p>
             <a:fld id="{95B7E5AE-4E20-4443-8EB7-6826520C18AF}" type="datetimeFigureOut">
               <a:rPr kumimoji="1" lang="zh-TW" altLang="en-US" smtClean="0"/>
-              <a:t>2023/4/24</a:t>
+              <a:t>2023/4/27</a:t>
             </a:fld>
             <a:endParaRPr kumimoji="1" lang="zh-TW" altLang="en-US"/>
           </a:p>
@@ -1409,7 +1409,7 @@
           <a:p>
             <a:fld id="{95B7E5AE-4E20-4443-8EB7-6826520C18AF}" type="datetimeFigureOut">
               <a:rPr kumimoji="1" lang="zh-TW" altLang="en-US" smtClean="0"/>
-              <a:t>2023/4/24</a:t>
+              <a:t>2023/4/27</a:t>
             </a:fld>
             <a:endParaRPr kumimoji="1" lang="zh-TW" altLang="en-US"/>
           </a:p>
@@ -1821,7 +1821,7 @@
           <a:p>
             <a:fld id="{95B7E5AE-4E20-4443-8EB7-6826520C18AF}" type="datetimeFigureOut">
               <a:rPr kumimoji="1" lang="zh-TW" altLang="en-US" smtClean="0"/>
-              <a:t>2023/4/24</a:t>
+              <a:t>2023/4/27</a:t>
             </a:fld>
             <a:endParaRPr kumimoji="1" lang="zh-TW" altLang="en-US"/>
           </a:p>
@@ -1962,7 +1962,7 @@
           <a:p>
             <a:fld id="{95B7E5AE-4E20-4443-8EB7-6826520C18AF}" type="datetimeFigureOut">
               <a:rPr kumimoji="1" lang="zh-TW" altLang="en-US" smtClean="0"/>
-              <a:t>2023/4/24</a:t>
+              <a:t>2023/4/27</a:t>
             </a:fld>
             <a:endParaRPr kumimoji="1" lang="zh-TW" altLang="en-US"/>
           </a:p>
@@ -2075,7 +2075,7 @@
           <a:p>
             <a:fld id="{95B7E5AE-4E20-4443-8EB7-6826520C18AF}" type="datetimeFigureOut">
               <a:rPr kumimoji="1" lang="zh-TW" altLang="en-US" smtClean="0"/>
-              <a:t>2023/4/24</a:t>
+              <a:t>2023/4/27</a:t>
             </a:fld>
             <a:endParaRPr kumimoji="1" lang="zh-TW" altLang="en-US"/>
           </a:p>
@@ -2386,7 +2386,7 @@
           <a:p>
             <a:fld id="{95B7E5AE-4E20-4443-8EB7-6826520C18AF}" type="datetimeFigureOut">
               <a:rPr kumimoji="1" lang="zh-TW" altLang="en-US" smtClean="0"/>
-              <a:t>2023/4/24</a:t>
+              <a:t>2023/4/27</a:t>
             </a:fld>
             <a:endParaRPr kumimoji="1" lang="zh-TW" altLang="en-US"/>
           </a:p>
@@ -2674,7 +2674,7 @@
           <a:p>
             <a:fld id="{95B7E5AE-4E20-4443-8EB7-6826520C18AF}" type="datetimeFigureOut">
               <a:rPr kumimoji="1" lang="zh-TW" altLang="en-US" smtClean="0"/>
-              <a:t>2023/4/24</a:t>
+              <a:t>2023/4/27</a:t>
             </a:fld>
             <a:endParaRPr kumimoji="1" lang="zh-TW" altLang="en-US"/>
           </a:p>
@@ -2915,7 +2915,7 @@
           <a:p>
             <a:fld id="{95B7E5AE-4E20-4443-8EB7-6826520C18AF}" type="datetimeFigureOut">
               <a:rPr kumimoji="1" lang="zh-TW" altLang="en-US" smtClean="0"/>
-              <a:t>2023/4/24</a:t>
+              <a:t>2023/4/27</a:t>
             </a:fld>
             <a:endParaRPr kumimoji="1" lang="zh-TW" altLang="en-US"/>
           </a:p>
@@ -5326,6 +5326,223 @@
           </a:p>
         </p:txBody>
       </p:sp>
+      <p:sp>
+        <p:nvSpPr>
+          <p:cNvPr id="24" name="文字方塊 23">
+            <a:extLst>
+              <a:ext uri="{FF2B5EF4-FFF2-40B4-BE49-F238E27FC236}">
+                <a16:creationId xmlns:a16="http://schemas.microsoft.com/office/drawing/2014/main" id="{6F03C56D-E64E-3526-8C2D-7105AE8279D5}"/>
+              </a:ext>
+            </a:extLst>
+          </p:cNvPr>
+          <p:cNvSpPr txBox="1"/>
+          <p:nvPr/>
+        </p:nvSpPr>
+        <p:spPr>
+          <a:xfrm>
+            <a:off x="1117548" y="4679257"/>
+            <a:ext cx="1992853" cy="1200329"/>
+          </a:xfrm>
+          <a:prstGeom prst="rect">
+            <a:avLst/>
+          </a:prstGeom>
+          <a:noFill/>
+        </p:spPr>
+        <p:txBody>
+          <a:bodyPr wrap="none" rtlCol="0">
+            <a:spAutoFit/>
+          </a:bodyPr>
+          <a:lstStyle/>
+          <a:p>
+            <a:r>
+              <a:rPr lang="en" altLang="zh-TW" b="1" i="0" u="none" strike="noStrike" dirty="0">
+                <a:effectLst/>
+                <a:latin typeface="Arial" panose="020B0604020202020204" pitchFamily="34" charset="0"/>
+              </a:rPr>
+              <a:t>Freshman</a:t>
+            </a:r>
+            <a:r>
+              <a:rPr lang="en" altLang="zh-TW" b="0" i="0" u="none" strike="noStrike" dirty="0">
+                <a:effectLst/>
+                <a:latin typeface="Arial" panose="020B0604020202020204" pitchFamily="34" charset="0"/>
+              </a:rPr>
+              <a:t> </a:t>
+            </a:r>
+            <a:r>
+              <a:rPr lang="zh-TW" altLang="en-US" b="0" i="0" u="none" strike="noStrike" dirty="0">
+                <a:effectLst/>
+                <a:latin typeface="Arial" panose="020B0604020202020204" pitchFamily="34" charset="0"/>
+              </a:rPr>
+              <a:t>大一</a:t>
+            </a:r>
+            <a:br>
+              <a:rPr lang="zh-TW" altLang="en-US" dirty="0"/>
+            </a:br>
+            <a:r>
+              <a:rPr lang="en" altLang="zh-TW" b="1" i="0" u="none" strike="noStrike" dirty="0">
+                <a:effectLst/>
+                <a:latin typeface="Arial" panose="020B0604020202020204" pitchFamily="34" charset="0"/>
+              </a:rPr>
+              <a:t>Sophomore</a:t>
+            </a:r>
+            <a:r>
+              <a:rPr lang="en" altLang="zh-TW" b="0" i="0" u="none" strike="noStrike" dirty="0">
+                <a:effectLst/>
+                <a:latin typeface="Arial" panose="020B0604020202020204" pitchFamily="34" charset="0"/>
+              </a:rPr>
+              <a:t> </a:t>
+            </a:r>
+            <a:r>
+              <a:rPr lang="zh-TW" altLang="en-US" b="0" i="0" u="none" strike="noStrike" dirty="0">
+                <a:effectLst/>
+                <a:latin typeface="Arial" panose="020B0604020202020204" pitchFamily="34" charset="0"/>
+              </a:rPr>
+              <a:t>大二</a:t>
+            </a:r>
+            <a:br>
+              <a:rPr lang="zh-TW" altLang="en-US" dirty="0"/>
+            </a:br>
+            <a:r>
+              <a:rPr lang="en" altLang="zh-TW" b="1" i="0" u="none" strike="noStrike" dirty="0">
+                <a:effectLst/>
+                <a:latin typeface="Arial" panose="020B0604020202020204" pitchFamily="34" charset="0"/>
+              </a:rPr>
+              <a:t>Junior</a:t>
+            </a:r>
+            <a:r>
+              <a:rPr lang="en" altLang="zh-TW" b="0" i="0" u="none" strike="noStrike" dirty="0">
+                <a:effectLst/>
+                <a:latin typeface="Arial" panose="020B0604020202020204" pitchFamily="34" charset="0"/>
+              </a:rPr>
+              <a:t> </a:t>
+            </a:r>
+            <a:r>
+              <a:rPr lang="zh-TW" altLang="en-US" b="0" i="0" u="none" strike="noStrike" dirty="0">
+                <a:effectLst/>
+                <a:latin typeface="Arial" panose="020B0604020202020204" pitchFamily="34" charset="0"/>
+              </a:rPr>
+              <a:t>大三</a:t>
+            </a:r>
+            <a:br>
+              <a:rPr lang="zh-TW" altLang="en-US" dirty="0"/>
+            </a:br>
+            <a:r>
+              <a:rPr lang="en" altLang="zh-TW" b="1" i="0" u="none" strike="noStrike" dirty="0">
+                <a:effectLst/>
+                <a:latin typeface="Arial" panose="020B0604020202020204" pitchFamily="34" charset="0"/>
+              </a:rPr>
+              <a:t>Senior</a:t>
+            </a:r>
+            <a:r>
+              <a:rPr lang="en" altLang="zh-TW" b="0" i="0" u="none" strike="noStrike" dirty="0">
+                <a:effectLst/>
+                <a:latin typeface="Arial" panose="020B0604020202020204" pitchFamily="34" charset="0"/>
+              </a:rPr>
+              <a:t> </a:t>
+            </a:r>
+            <a:r>
+              <a:rPr lang="zh-TW" altLang="en-US" b="0" i="0" u="none" strike="noStrike" dirty="0">
+                <a:effectLst/>
+                <a:latin typeface="Arial" panose="020B0604020202020204" pitchFamily="34" charset="0"/>
+              </a:rPr>
+              <a:t>大四</a:t>
+            </a:r>
+            <a:endParaRPr kumimoji="1" lang="zh-TW" altLang="en-US" dirty="0"/>
+          </a:p>
+        </p:txBody>
+      </p:sp>
+      <p:sp>
+        <p:nvSpPr>
+          <p:cNvPr id="25" name="文字方塊 24">
+            <a:extLst>
+              <a:ext uri="{FF2B5EF4-FFF2-40B4-BE49-F238E27FC236}">
+                <a16:creationId xmlns:a16="http://schemas.microsoft.com/office/drawing/2014/main" id="{43BE22C5-C4D5-62B0-3620-533FE6EE8435}"/>
+              </a:ext>
+            </a:extLst>
+          </p:cNvPr>
+          <p:cNvSpPr txBox="1"/>
+          <p:nvPr/>
+        </p:nvSpPr>
+        <p:spPr>
+          <a:xfrm>
+            <a:off x="1117548" y="5865640"/>
+            <a:ext cx="6750566" cy="369332"/>
+          </a:xfrm>
+          <a:prstGeom prst="rect">
+            <a:avLst/>
+          </a:prstGeom>
+          <a:noFill/>
+        </p:spPr>
+        <p:txBody>
+          <a:bodyPr wrap="none" rtlCol="0">
+            <a:spAutoFit/>
+          </a:bodyPr>
+          <a:lstStyle/>
+          <a:p>
+            <a:r>
+              <a:rPr lang="en" altLang="zh-TW" b="1" i="0" u="none" strike="noStrike" dirty="0">
+                <a:effectLst/>
+                <a:latin typeface="Arial" panose="020B0604020202020204" pitchFamily="34" charset="0"/>
+              </a:rPr>
+              <a:t>First year / Second year / Third year of graduate school </a:t>
+            </a:r>
+            <a:r>
+              <a:rPr lang="zh-TW" altLang="en-US" b="1" i="0" u="none" strike="noStrike" dirty="0">
+                <a:effectLst/>
+                <a:latin typeface="Arial" panose="020B0604020202020204" pitchFamily="34" charset="0"/>
+              </a:rPr>
+              <a:t>碩士</a:t>
+            </a:r>
+            <a:endParaRPr kumimoji="1" lang="zh-TW" altLang="en-US" dirty="0"/>
+          </a:p>
+        </p:txBody>
+      </p:sp>
+      <p:sp>
+        <p:nvSpPr>
+          <p:cNvPr id="26" name="文字方塊 25">
+            <a:extLst>
+              <a:ext uri="{FF2B5EF4-FFF2-40B4-BE49-F238E27FC236}">
+                <a16:creationId xmlns:a16="http://schemas.microsoft.com/office/drawing/2014/main" id="{51256142-B52D-BCAD-5C4D-B8B96A41388E}"/>
+              </a:ext>
+            </a:extLst>
+          </p:cNvPr>
+          <p:cNvSpPr txBox="1"/>
+          <p:nvPr/>
+        </p:nvSpPr>
+        <p:spPr>
+          <a:xfrm>
+            <a:off x="1177665" y="6276461"/>
+            <a:ext cx="6878806" cy="369332"/>
+          </a:xfrm>
+          <a:prstGeom prst="rect">
+            <a:avLst/>
+          </a:prstGeom>
+          <a:noFill/>
+        </p:spPr>
+        <p:txBody>
+          <a:bodyPr wrap="none" rtlCol="0">
+            <a:spAutoFit/>
+          </a:bodyPr>
+          <a:lstStyle/>
+          <a:p>
+            <a:r>
+              <a:rPr lang="en" altLang="zh-TW" b="1" i="0" u="none" strike="noStrike" dirty="0">
+                <a:effectLst/>
+                <a:latin typeface="Arial" panose="020B0604020202020204" pitchFamily="34" charset="0"/>
+              </a:rPr>
+              <a:t>First year / Second year / Third year of doctoral program</a:t>
+            </a:r>
+            <a:r>
+              <a:rPr lang="zh-TW" altLang="en-US" b="1" i="0" u="none" strike="noStrike" dirty="0">
+                <a:effectLst/>
+                <a:latin typeface="Arial" panose="020B0604020202020204" pitchFamily="34" charset="0"/>
+              </a:rPr>
+              <a:t> 博士</a:t>
+            </a:r>
+            <a:endParaRPr kumimoji="1" lang="zh-TW" altLang="en-US" dirty="0"/>
+          </a:p>
+        </p:txBody>
+      </p:sp>
     </p:spTree>
     <p:extLst>
       <p:ext uri="{BB962C8B-B14F-4D97-AF65-F5344CB8AC3E}">
@@ -6090,7 +6307,11 @@
               <a:t>{2}</a:t>
             </a:r>
             <a:r>
-              <a:rPr kumimoji="1" lang="zh-TW" altLang="en-US" dirty="0"/>
+              <a:rPr kumimoji="1" lang="zh-TW" altLang="en-US" dirty="0">
+                <a:solidFill>
+                  <a:srgbClr val="FFC000"/>
+                </a:solidFill>
+              </a:rPr>
               <a:t>匯入檔案</a:t>
             </a:r>
             <a:r>
@@ -6730,14 +6951,14 @@
           <p:nvPr>
             <p:extLst>
               <p:ext uri="{D42A27DB-BD31-4B8C-83A1-F6EECF244321}">
-                <p14:modId xmlns:p14="http://schemas.microsoft.com/office/powerpoint/2010/main" val="1117103731"/>
+                <p14:modId xmlns:p14="http://schemas.microsoft.com/office/powerpoint/2010/main" val="2804905626"/>
               </p:ext>
             </p:extLst>
           </p:nvPr>
         </p:nvGraphicFramePr>
         <p:xfrm>
-          <a:off x="1118156" y="353461"/>
-          <a:ext cx="3616281" cy="1559560"/>
+          <a:off x="1118155" y="353461"/>
+          <a:ext cx="3767650" cy="1559560"/>
         </p:xfrm>
         <a:graphic>
           <a:graphicData uri="http://schemas.openxmlformats.org/drawingml/2006/table">
@@ -6746,63 +6967,70 @@
                 <a:tableStyleId>{5C22544A-7EE6-4342-B048-85BDC9FD1C3A}</a:tableStyleId>
               </a:tblPr>
               <a:tblGrid>
-                <a:gridCol w="401809">
+                <a:gridCol w="376765">
+                  <a:extLst>
+                    <a:ext uri="{9D8B030D-6E8A-4147-A177-3AD203B41FA5}">
+                      <a16:colId xmlns:a16="http://schemas.microsoft.com/office/drawing/2014/main" val="2858611221"/>
+                    </a:ext>
+                  </a:extLst>
+                </a:gridCol>
+                <a:gridCol w="376765">
                   <a:extLst>
                     <a:ext uri="{9D8B030D-6E8A-4147-A177-3AD203B41FA5}">
                       <a16:colId xmlns:a16="http://schemas.microsoft.com/office/drawing/2014/main" val="2186197128"/>
                     </a:ext>
                   </a:extLst>
                 </a:gridCol>
-                <a:gridCol w="401809">
+                <a:gridCol w="376765">
                   <a:extLst>
                     <a:ext uri="{9D8B030D-6E8A-4147-A177-3AD203B41FA5}">
                       <a16:colId xmlns:a16="http://schemas.microsoft.com/office/drawing/2014/main" val="3109274087"/>
                     </a:ext>
                   </a:extLst>
                 </a:gridCol>
-                <a:gridCol w="401809">
+                <a:gridCol w="376765">
                   <a:extLst>
                     <a:ext uri="{9D8B030D-6E8A-4147-A177-3AD203B41FA5}">
                       <a16:colId xmlns:a16="http://schemas.microsoft.com/office/drawing/2014/main" val="49729136"/>
                     </a:ext>
                   </a:extLst>
                 </a:gridCol>
-                <a:gridCol w="401809">
+                <a:gridCol w="376765">
                   <a:extLst>
                     <a:ext uri="{9D8B030D-6E8A-4147-A177-3AD203B41FA5}">
                       <a16:colId xmlns:a16="http://schemas.microsoft.com/office/drawing/2014/main" val="1177570816"/>
                     </a:ext>
                   </a:extLst>
                 </a:gridCol>
-                <a:gridCol w="401809">
+                <a:gridCol w="376765">
                   <a:extLst>
                     <a:ext uri="{9D8B030D-6E8A-4147-A177-3AD203B41FA5}">
                       <a16:colId xmlns:a16="http://schemas.microsoft.com/office/drawing/2014/main" val="2622603265"/>
                     </a:ext>
                   </a:extLst>
                 </a:gridCol>
-                <a:gridCol w="401809">
+                <a:gridCol w="376765">
                   <a:extLst>
                     <a:ext uri="{9D8B030D-6E8A-4147-A177-3AD203B41FA5}">
                       <a16:colId xmlns:a16="http://schemas.microsoft.com/office/drawing/2014/main" val="759417621"/>
                     </a:ext>
                   </a:extLst>
                 </a:gridCol>
-                <a:gridCol w="401809">
+                <a:gridCol w="376765">
                   <a:extLst>
                     <a:ext uri="{9D8B030D-6E8A-4147-A177-3AD203B41FA5}">
                       <a16:colId xmlns:a16="http://schemas.microsoft.com/office/drawing/2014/main" val="2796036593"/>
                     </a:ext>
                   </a:extLst>
                 </a:gridCol>
-                <a:gridCol w="401809">
+                <a:gridCol w="376765">
                   <a:extLst>
                     <a:ext uri="{9D8B030D-6E8A-4147-A177-3AD203B41FA5}">
                       <a16:colId xmlns:a16="http://schemas.microsoft.com/office/drawing/2014/main" val="2524246151"/>
                     </a:ext>
                   </a:extLst>
                 </a:gridCol>
-                <a:gridCol w="401809">
+                <a:gridCol w="376765">
                   <a:extLst>
                     <a:ext uri="{9D8B030D-6E8A-4147-A177-3AD203B41FA5}">
                       <a16:colId xmlns:a16="http://schemas.microsoft.com/office/drawing/2014/main" val="2195110110"/>
@@ -6818,6 +7046,19 @@
                     <a:p>
                       <a:r>
                         <a:rPr lang="zh-TW" altLang="en-US" dirty="0"/>
+                        <a:t>編號</a:t>
+                      </a:r>
+                    </a:p>
+                  </a:txBody>
+                  <a:tcPr/>
+                </a:tc>
+                <a:tc>
+                  <a:txBody>
+                    <a:bodyPr/>
+                    <a:lstStyle/>
+                    <a:p>
+                      <a:r>
+                        <a:rPr lang="zh-TW" altLang="en-US" dirty="0"/>
                         <a:t>書名</a:t>
                       </a:r>
                     </a:p>
@@ -6935,6 +7176,16 @@
                 </a:extLst>
               </a:tr>
               <a:tr h="370840">
+                <a:tc>
+                  <a:txBody>
+                    <a:bodyPr/>
+                    <a:lstStyle/>
+                    <a:p>
+                      <a:endParaRPr lang="zh-TW" altLang="en-US" dirty="0"/>
+                    </a:p>
+                  </a:txBody>
+                  <a:tcPr/>
+                </a:tc>
                 <a:tc>
                   <a:txBody>
                     <a:bodyPr/>
@@ -7120,7 +7371,7 @@
         </p:nvSpPr>
         <p:spPr>
           <a:xfrm>
-            <a:off x="638530" y="2743746"/>
+            <a:off x="734473" y="3104693"/>
             <a:ext cx="370614" cy="369332"/>
           </a:xfrm>
           <a:prstGeom prst="rect">
@@ -7144,10 +7395,10 @@
       </p:sp>
       <p:graphicFrame>
         <p:nvGraphicFramePr>
-          <p:cNvPr id="10" name="表格 9">
-            <a:extLst>
-              <a:ext uri="{FF2B5EF4-FFF2-40B4-BE49-F238E27FC236}">
-                <a16:creationId xmlns:a16="http://schemas.microsoft.com/office/drawing/2014/main" id="{27AF903A-6D4E-5084-C17C-9FECE856453C}"/>
+          <p:cNvPr id="16" name="表格 15">
+            <a:extLst>
+              <a:ext uri="{FF2B5EF4-FFF2-40B4-BE49-F238E27FC236}">
+                <a16:creationId xmlns:a16="http://schemas.microsoft.com/office/drawing/2014/main" id="{C5B25C14-731C-9B38-042E-82264A6A620D}"/>
               </a:ext>
             </a:extLst>
           </p:cNvPr>
@@ -7157,360 +7408,13 @@
           <p:nvPr>
             <p:extLst>
               <p:ext uri="{D42A27DB-BD31-4B8C-83A1-F6EECF244321}">
-                <p14:modId xmlns:p14="http://schemas.microsoft.com/office/powerpoint/2010/main" val="3253153746"/>
+                <p14:modId xmlns:p14="http://schemas.microsoft.com/office/powerpoint/2010/main" val="3900444613"/>
               </p:ext>
             </p:extLst>
           </p:nvPr>
         </p:nvGraphicFramePr>
         <p:xfrm>
-          <a:off x="1286038" y="2743746"/>
-          <a:ext cx="2529581" cy="1010920"/>
-        </p:xfrm>
-        <a:graphic>
-          <a:graphicData uri="http://schemas.openxmlformats.org/drawingml/2006/table">
-            <a:tbl>
-              <a:tblPr firstRow="1" bandRow="1">
-                <a:tableStyleId>{5C22544A-7EE6-4342-B048-85BDC9FD1C3A}</a:tableStyleId>
-              </a:tblPr>
-              <a:tblGrid>
-                <a:gridCol w="434478">
-                  <a:extLst>
-                    <a:ext uri="{9D8B030D-6E8A-4147-A177-3AD203B41FA5}">
-                      <a16:colId xmlns:a16="http://schemas.microsoft.com/office/drawing/2014/main" val="34541753"/>
-                    </a:ext>
-                  </a:extLst>
-                </a:gridCol>
-                <a:gridCol w="455204">
-                  <a:extLst>
-                    <a:ext uri="{9D8B030D-6E8A-4147-A177-3AD203B41FA5}">
-                      <a16:colId xmlns:a16="http://schemas.microsoft.com/office/drawing/2014/main" val="2923872845"/>
-                    </a:ext>
-                  </a:extLst>
-                </a:gridCol>
-                <a:gridCol w="546633">
-                  <a:extLst>
-                    <a:ext uri="{9D8B030D-6E8A-4147-A177-3AD203B41FA5}">
-                      <a16:colId xmlns:a16="http://schemas.microsoft.com/office/drawing/2014/main" val="2006399195"/>
-                    </a:ext>
-                  </a:extLst>
-                </a:gridCol>
-                <a:gridCol w="546633">
-                  <a:extLst>
-                    <a:ext uri="{9D8B030D-6E8A-4147-A177-3AD203B41FA5}">
-                      <a16:colId xmlns:a16="http://schemas.microsoft.com/office/drawing/2014/main" val="1557960323"/>
-                    </a:ext>
-                  </a:extLst>
-                </a:gridCol>
-                <a:gridCol w="546633">
-                  <a:extLst>
-                    <a:ext uri="{9D8B030D-6E8A-4147-A177-3AD203B41FA5}">
-                      <a16:colId xmlns:a16="http://schemas.microsoft.com/office/drawing/2014/main" val="543044002"/>
-                    </a:ext>
-                  </a:extLst>
-                </a:gridCol>
-              </a:tblGrid>
-              <a:tr h="370840">
-                <a:tc>
-                  <a:txBody>
-                    <a:bodyPr/>
-                    <a:lstStyle/>
-                    <a:p>
-                      <a:r>
-                        <a:rPr lang="zh-TW" altLang="en-US" dirty="0"/>
-                        <a:t>編碼</a:t>
-                      </a:r>
-                    </a:p>
-                  </a:txBody>
-                  <a:tcPr/>
-                </a:tc>
-                <a:tc>
-                  <a:txBody>
-                    <a:bodyPr/>
-                    <a:lstStyle/>
-                    <a:p>
-                      <a:r>
-                        <a:rPr lang="zh-TW" altLang="en-US" dirty="0"/>
-                        <a:t>姓名</a:t>
-                      </a:r>
-                    </a:p>
-                  </a:txBody>
-                  <a:tcPr/>
-                </a:tc>
-                <a:tc>
-                  <a:txBody>
-                    <a:bodyPr/>
-                    <a:lstStyle/>
-                    <a:p>
-                      <a:r>
-                        <a:rPr lang="zh-TW" altLang="en-US" dirty="0"/>
-                        <a:t>學號</a:t>
-                      </a:r>
-                    </a:p>
-                  </a:txBody>
-                  <a:tcPr/>
-                </a:tc>
-                <a:tc>
-                  <a:txBody>
-                    <a:bodyPr/>
-                    <a:lstStyle/>
-                    <a:p>
-                      <a:r>
-                        <a:rPr lang="zh-TW" altLang="en-US" dirty="0"/>
-                        <a:t>年級</a:t>
-                      </a:r>
-                    </a:p>
-                  </a:txBody>
-                  <a:tcPr/>
-                </a:tc>
-                <a:tc>
-                  <a:txBody>
-                    <a:bodyPr/>
-                    <a:lstStyle/>
-                    <a:p>
-                      <a:r>
-                        <a:rPr lang="en-US" altLang="zh-TW" dirty="0"/>
-                        <a:t>Email</a:t>
-                      </a:r>
-                      <a:endParaRPr lang="zh-TW" altLang="en-US" dirty="0"/>
-                    </a:p>
-                  </a:txBody>
-                  <a:tcPr/>
-                </a:tc>
-                <a:extLst>
-                  <a:ext uri="{0D108BD9-81ED-4DB2-BD59-A6C34878D82A}">
-                    <a16:rowId xmlns:a16="http://schemas.microsoft.com/office/drawing/2014/main" val="3142360024"/>
-                  </a:ext>
-                </a:extLst>
-              </a:tr>
-              <a:tr h="370840">
-                <a:tc>
-                  <a:txBody>
-                    <a:bodyPr/>
-                    <a:lstStyle/>
-                    <a:p>
-                      <a:endParaRPr lang="zh-TW" altLang="en-US" dirty="0"/>
-                    </a:p>
-                  </a:txBody>
-                  <a:tcPr/>
-                </a:tc>
-                <a:tc>
-                  <a:txBody>
-                    <a:bodyPr/>
-                    <a:lstStyle/>
-                    <a:p>
-                      <a:endParaRPr lang="zh-TW" altLang="en-US"/>
-                    </a:p>
-                  </a:txBody>
-                  <a:tcPr/>
-                </a:tc>
-                <a:tc>
-                  <a:txBody>
-                    <a:bodyPr/>
-                    <a:lstStyle/>
-                    <a:p>
-                      <a:endParaRPr lang="zh-TW" altLang="en-US"/>
-                    </a:p>
-                  </a:txBody>
-                  <a:tcPr/>
-                </a:tc>
-                <a:tc>
-                  <a:txBody>
-                    <a:bodyPr/>
-                    <a:lstStyle/>
-                    <a:p>
-                      <a:endParaRPr lang="zh-TW" altLang="en-US"/>
-                    </a:p>
-                  </a:txBody>
-                  <a:tcPr/>
-                </a:tc>
-                <a:tc>
-                  <a:txBody>
-                    <a:bodyPr/>
-                    <a:lstStyle/>
-                    <a:p>
-                      <a:endParaRPr lang="zh-TW" altLang="en-US" dirty="0"/>
-                    </a:p>
-                  </a:txBody>
-                  <a:tcPr/>
-                </a:tc>
-                <a:extLst>
-                  <a:ext uri="{0D108BD9-81ED-4DB2-BD59-A6C34878D82A}">
-                    <a16:rowId xmlns:a16="http://schemas.microsoft.com/office/drawing/2014/main" val="996333669"/>
-                  </a:ext>
-                </a:extLst>
-              </a:tr>
-            </a:tbl>
-          </a:graphicData>
-        </a:graphic>
-      </p:graphicFrame>
-      <p:sp>
-        <p:nvSpPr>
-          <p:cNvPr id="11" name="文字方塊 10">
-            <a:extLst>
-              <a:ext uri="{FF2B5EF4-FFF2-40B4-BE49-F238E27FC236}">
-                <a16:creationId xmlns:a16="http://schemas.microsoft.com/office/drawing/2014/main" id="{7A8AB2DA-FACA-017A-0896-79E18E3628E5}"/>
-              </a:ext>
-            </a:extLst>
-          </p:cNvPr>
-          <p:cNvSpPr txBox="1"/>
-          <p:nvPr/>
-        </p:nvSpPr>
-        <p:spPr>
-          <a:xfrm>
-            <a:off x="662033" y="4082353"/>
-            <a:ext cx="1755609" cy="369332"/>
-          </a:xfrm>
-          <a:prstGeom prst="rect">
-            <a:avLst/>
-          </a:prstGeom>
-          <a:noFill/>
-        </p:spPr>
-        <p:txBody>
-          <a:bodyPr wrap="none" rtlCol="0">
-            <a:spAutoFit/>
-          </a:bodyPr>
-          <a:lstStyle/>
-          <a:p>
-            <a:r>
-              <a:rPr kumimoji="1" lang="en-US" altLang="zh-TW" dirty="0"/>
-              <a:t>-&gt;</a:t>
-            </a:r>
-            <a:r>
-              <a:rPr kumimoji="1" lang="zh-TW" altLang="en-US" dirty="0"/>
-              <a:t>查看詳細資料</a:t>
-            </a:r>
-          </a:p>
-        </p:txBody>
-      </p:sp>
-      <p:sp>
-        <p:nvSpPr>
-          <p:cNvPr id="12" name="文字方塊 11">
-            <a:extLst>
-              <a:ext uri="{FF2B5EF4-FFF2-40B4-BE49-F238E27FC236}">
-                <a16:creationId xmlns:a16="http://schemas.microsoft.com/office/drawing/2014/main" id="{2C57DFC6-E581-E4E0-E73F-A61FF2A87E2B}"/>
-              </a:ext>
-            </a:extLst>
-          </p:cNvPr>
-          <p:cNvSpPr txBox="1"/>
-          <p:nvPr/>
-        </p:nvSpPr>
-        <p:spPr>
-          <a:xfrm>
-            <a:off x="675406" y="4539275"/>
-            <a:ext cx="935064" cy="369332"/>
-          </a:xfrm>
-          <a:prstGeom prst="rect">
-            <a:avLst/>
-          </a:prstGeom>
-          <a:noFill/>
-        </p:spPr>
-        <p:txBody>
-          <a:bodyPr wrap="none" rtlCol="0">
-            <a:spAutoFit/>
-          </a:bodyPr>
-          <a:lstStyle/>
-          <a:p>
-            <a:r>
-              <a:rPr kumimoji="1" lang="en-US" altLang="zh-TW" dirty="0"/>
-              <a:t>-&gt;Enter:</a:t>
-            </a:r>
-            <a:endParaRPr kumimoji="1" lang="zh-TW" altLang="en-US" dirty="0"/>
-          </a:p>
-        </p:txBody>
-      </p:sp>
-      <p:sp>
-        <p:nvSpPr>
-          <p:cNvPr id="14" name="文字方塊 13">
-            <a:extLst>
-              <a:ext uri="{FF2B5EF4-FFF2-40B4-BE49-F238E27FC236}">
-                <a16:creationId xmlns:a16="http://schemas.microsoft.com/office/drawing/2014/main" id="{46C578F2-6896-A0D6-5DBC-ED7FF769A335}"/>
-              </a:ext>
-            </a:extLst>
-          </p:cNvPr>
-          <p:cNvSpPr txBox="1"/>
-          <p:nvPr/>
-        </p:nvSpPr>
-        <p:spPr>
-          <a:xfrm>
-            <a:off x="1069408" y="4996197"/>
-            <a:ext cx="370614" cy="369332"/>
-          </a:xfrm>
-          <a:prstGeom prst="rect">
-            <a:avLst/>
-          </a:prstGeom>
-          <a:noFill/>
-        </p:spPr>
-        <p:txBody>
-          <a:bodyPr wrap="none" rtlCol="0">
-            <a:spAutoFit/>
-          </a:bodyPr>
-          <a:lstStyle/>
-          <a:p>
-            <a:r>
-              <a:rPr kumimoji="1" lang="en-US" altLang="zh-TW" dirty="0"/>
-              <a:t>-&gt;</a:t>
-            </a:r>
-            <a:endParaRPr kumimoji="1" lang="zh-TW" altLang="en-US" dirty="0"/>
-          </a:p>
-        </p:txBody>
-      </p:sp>
-      <p:sp>
-        <p:nvSpPr>
-          <p:cNvPr id="15" name="文字方塊 14">
-            <a:extLst>
-              <a:ext uri="{FF2B5EF4-FFF2-40B4-BE49-F238E27FC236}">
-                <a16:creationId xmlns:a16="http://schemas.microsoft.com/office/drawing/2014/main" id="{2DBD4443-F3AE-A9F9-4356-2A7C6E481360}"/>
-              </a:ext>
-            </a:extLst>
-          </p:cNvPr>
-          <p:cNvSpPr txBox="1"/>
-          <p:nvPr/>
-        </p:nvSpPr>
-        <p:spPr>
-          <a:xfrm>
-            <a:off x="1973179" y="4539275"/>
-            <a:ext cx="1569660" cy="369332"/>
-          </a:xfrm>
-          <a:prstGeom prst="rect">
-            <a:avLst/>
-          </a:prstGeom>
-          <a:noFill/>
-        </p:spPr>
-        <p:txBody>
-          <a:bodyPr wrap="none" rtlCol="0">
-            <a:spAutoFit/>
-          </a:bodyPr>
-          <a:lstStyle/>
-          <a:p>
-            <a:r>
-              <a:rPr kumimoji="1" lang="zh-TW" altLang="en-US" dirty="0"/>
-              <a:t>（輸入編號）</a:t>
-            </a:r>
-          </a:p>
-        </p:txBody>
-      </p:sp>
-      <p:graphicFrame>
-        <p:nvGraphicFramePr>
-          <p:cNvPr id="16" name="表格 15">
-            <a:extLst>
-              <a:ext uri="{FF2B5EF4-FFF2-40B4-BE49-F238E27FC236}">
-                <a16:creationId xmlns:a16="http://schemas.microsoft.com/office/drawing/2014/main" id="{C5B25C14-731C-9B38-042E-82264A6A620D}"/>
-              </a:ext>
-            </a:extLst>
-          </p:cNvPr>
-          <p:cNvGraphicFramePr>
-            <a:graphicFrameLocks noGrp="1"/>
-          </p:cNvGraphicFramePr>
-          <p:nvPr>
-            <p:extLst>
-              <p:ext uri="{D42A27DB-BD31-4B8C-83A1-F6EECF244321}">
-                <p14:modId xmlns:p14="http://schemas.microsoft.com/office/powerpoint/2010/main" val="2592486952"/>
-              </p:ext>
-            </p:extLst>
-          </p:nvPr>
-        </p:nvGraphicFramePr>
-        <p:xfrm>
-          <a:off x="1610470" y="5064205"/>
+          <a:off x="1214100" y="2796150"/>
           <a:ext cx="3767648" cy="1559560"/>
         </p:xfrm>
         <a:graphic>
@@ -7824,8 +7728,8 @@
         </p:nvSpPr>
         <p:spPr>
           <a:xfrm>
-            <a:off x="5727032" y="4996197"/>
-            <a:ext cx="1293944" cy="369332"/>
+            <a:off x="1141963" y="4355710"/>
+            <a:ext cx="1845377" cy="369332"/>
           </a:xfrm>
           <a:prstGeom prst="rect">
             <a:avLst/>
@@ -7844,7 +7748,15 @@
             </a:r>
             <a:r>
               <a:rPr kumimoji="1" lang="zh-TW" altLang="en-US" dirty="0"/>
-              <a:t>修改資料</a:t>
+              <a:t>修改</a:t>
+            </a:r>
+            <a:r>
+              <a:rPr kumimoji="1" lang="en-US" altLang="zh-TW" dirty="0"/>
+              <a:t>/</a:t>
+            </a:r>
+            <a:r>
+              <a:rPr kumimoji="1" lang="zh-TW" altLang="en-US" dirty="0"/>
+              <a:t>刪除資料</a:t>
             </a:r>
           </a:p>
         </p:txBody>
@@ -7863,7 +7775,7 @@
         </p:nvSpPr>
         <p:spPr>
           <a:xfrm>
-            <a:off x="5727032" y="5474653"/>
+            <a:off x="1141963" y="4834166"/>
             <a:ext cx="935064" cy="369332"/>
           </a:xfrm>
           <a:prstGeom prst="rect">
@@ -7882,6 +7794,41 @@
               <a:t>-&gt;Enter:</a:t>
             </a:r>
             <a:endParaRPr kumimoji="1" lang="zh-TW" altLang="en-US" dirty="0"/>
+          </a:p>
+        </p:txBody>
+      </p:sp>
+      <p:sp>
+        <p:nvSpPr>
+          <p:cNvPr id="2" name="文字方塊 1">
+            <a:extLst>
+              <a:ext uri="{FF2B5EF4-FFF2-40B4-BE49-F238E27FC236}">
+                <a16:creationId xmlns:a16="http://schemas.microsoft.com/office/drawing/2014/main" id="{F6CB8A22-89E8-70AE-9198-BEB9455E5D39}"/>
+              </a:ext>
+            </a:extLst>
+          </p:cNvPr>
+          <p:cNvSpPr txBox="1"/>
+          <p:nvPr/>
+        </p:nvSpPr>
+        <p:spPr>
+          <a:xfrm>
+            <a:off x="2077027" y="4834166"/>
+            <a:ext cx="1107996" cy="369332"/>
+          </a:xfrm>
+          <a:prstGeom prst="rect">
+            <a:avLst/>
+          </a:prstGeom>
+          <a:noFill/>
+        </p:spPr>
+        <p:txBody>
+          <a:bodyPr wrap="none" rtlCol="0">
+            <a:spAutoFit/>
+          </a:bodyPr>
+          <a:lstStyle/>
+          <a:p>
+            <a:r>
+              <a:rPr kumimoji="1" lang="zh-TW" altLang="en-US" dirty="0"/>
+              <a:t>輸入編號</a:t>
+            </a:r>
           </a:p>
         </p:txBody>
       </p:sp>

</xml_diff>